<commit_message>
atualizações na etapa transformação
</commit_message>
<xml_diff>
--- a/anexo/diagramas.pptx
+++ b/anexo/diagramas.pptx
@@ -1060,7 +1060,7 @@
           <a:p>
             <a:fld id="{E3F29CD9-4246-4F4F-BB3B-942F42C480CC}" type="datetimeFigureOut">
               <a:rPr lang="pt-BR" smtClean="0"/>
-              <a:t>01/03/2024</a:t>
+              <a:t>18/03/2024</a:t>
             </a:fld>
             <a:endParaRPr lang="pt-BR"/>
           </a:p>
@@ -2143,7 +2143,7 @@
           <a:p>
             <a:fld id="{C8B65674-A10E-4998-BFDD-52648E7BF404}" type="datetimeFigureOut">
               <a:rPr lang="pt-BR" smtClean="0"/>
-              <a:t>01/03/2024</a:t>
+              <a:t>18/03/2024</a:t>
             </a:fld>
             <a:endParaRPr lang="pt-BR"/>
           </a:p>
@@ -2313,7 +2313,7 @@
           <a:p>
             <a:fld id="{C8B65674-A10E-4998-BFDD-52648E7BF404}" type="datetimeFigureOut">
               <a:rPr lang="pt-BR" smtClean="0"/>
-              <a:t>01/03/2024</a:t>
+              <a:t>18/03/2024</a:t>
             </a:fld>
             <a:endParaRPr lang="pt-BR"/>
           </a:p>
@@ -2493,7 +2493,7 @@
           <a:p>
             <a:fld id="{C8B65674-A10E-4998-BFDD-52648E7BF404}" type="datetimeFigureOut">
               <a:rPr lang="pt-BR" smtClean="0"/>
-              <a:t>01/03/2024</a:t>
+              <a:t>18/03/2024</a:t>
             </a:fld>
             <a:endParaRPr lang="pt-BR"/>
           </a:p>
@@ -2663,7 +2663,7 @@
           <a:p>
             <a:fld id="{C8B65674-A10E-4998-BFDD-52648E7BF404}" type="datetimeFigureOut">
               <a:rPr lang="pt-BR" smtClean="0"/>
-              <a:t>01/03/2024</a:t>
+              <a:t>18/03/2024</a:t>
             </a:fld>
             <a:endParaRPr lang="pt-BR"/>
           </a:p>
@@ -2907,7 +2907,7 @@
           <a:p>
             <a:fld id="{C8B65674-A10E-4998-BFDD-52648E7BF404}" type="datetimeFigureOut">
               <a:rPr lang="pt-BR" smtClean="0"/>
-              <a:t>01/03/2024</a:t>
+              <a:t>18/03/2024</a:t>
             </a:fld>
             <a:endParaRPr lang="pt-BR"/>
           </a:p>
@@ -3139,7 +3139,7 @@
           <a:p>
             <a:fld id="{C8B65674-A10E-4998-BFDD-52648E7BF404}" type="datetimeFigureOut">
               <a:rPr lang="pt-BR" smtClean="0"/>
-              <a:t>01/03/2024</a:t>
+              <a:t>18/03/2024</a:t>
             </a:fld>
             <a:endParaRPr lang="pt-BR"/>
           </a:p>
@@ -3506,7 +3506,7 @@
           <a:p>
             <a:fld id="{C8B65674-A10E-4998-BFDD-52648E7BF404}" type="datetimeFigureOut">
               <a:rPr lang="pt-BR" smtClean="0"/>
-              <a:t>01/03/2024</a:t>
+              <a:t>18/03/2024</a:t>
             </a:fld>
             <a:endParaRPr lang="pt-BR"/>
           </a:p>
@@ -3624,7 +3624,7 @@
           <a:p>
             <a:fld id="{C8B65674-A10E-4998-BFDD-52648E7BF404}" type="datetimeFigureOut">
               <a:rPr lang="pt-BR" smtClean="0"/>
-              <a:t>01/03/2024</a:t>
+              <a:t>18/03/2024</a:t>
             </a:fld>
             <a:endParaRPr lang="pt-BR"/>
           </a:p>
@@ -3719,7 +3719,7 @@
           <a:p>
             <a:fld id="{C8B65674-A10E-4998-BFDD-52648E7BF404}" type="datetimeFigureOut">
               <a:rPr lang="pt-BR" smtClean="0"/>
-              <a:t>01/03/2024</a:t>
+              <a:t>18/03/2024</a:t>
             </a:fld>
             <a:endParaRPr lang="pt-BR"/>
           </a:p>
@@ -3996,7 +3996,7 @@
           <a:p>
             <a:fld id="{C8B65674-A10E-4998-BFDD-52648E7BF404}" type="datetimeFigureOut">
               <a:rPr lang="pt-BR" smtClean="0"/>
-              <a:t>01/03/2024</a:t>
+              <a:t>18/03/2024</a:t>
             </a:fld>
             <a:endParaRPr lang="pt-BR"/>
           </a:p>
@@ -4253,7 +4253,7 @@
           <a:p>
             <a:fld id="{C8B65674-A10E-4998-BFDD-52648E7BF404}" type="datetimeFigureOut">
               <a:rPr lang="pt-BR" smtClean="0"/>
-              <a:t>01/03/2024</a:t>
+              <a:t>18/03/2024</a:t>
             </a:fld>
             <a:endParaRPr lang="pt-BR"/>
           </a:p>
@@ -4466,7 +4466,7 @@
           <a:p>
             <a:fld id="{C8B65674-A10E-4998-BFDD-52648E7BF404}" type="datetimeFigureOut">
               <a:rPr lang="pt-BR" smtClean="0"/>
-              <a:t>01/03/2024</a:t>
+              <a:t>18/03/2024</a:t>
             </a:fld>
             <a:endParaRPr lang="pt-BR"/>
           </a:p>
@@ -9368,6 +9368,583 @@
           </a:fontRef>
         </p:style>
       </p:cxnSp>
+      <p:sp>
+        <p:nvSpPr>
+          <p:cNvPr id="2" name="Retângulo: Cantos Arredondados 1">
+            <a:extLst>
+              <a:ext uri="{FF2B5EF4-FFF2-40B4-BE49-F238E27FC236}">
+                <a16:creationId xmlns:a16="http://schemas.microsoft.com/office/drawing/2014/main" id="{62D353CE-E9B0-91FA-CCAF-6FD3E7792E97}"/>
+              </a:ext>
+            </a:extLst>
+          </p:cNvPr>
+          <p:cNvSpPr/>
+          <p:nvPr/>
+        </p:nvSpPr>
+        <p:spPr>
+          <a:xfrm>
+            <a:off x="8212203" y="24950830"/>
+            <a:ext cx="1768848" cy="440202"/>
+          </a:xfrm>
+          <a:prstGeom prst="roundRect">
+            <a:avLst>
+              <a:gd name="adj" fmla="val 4410"/>
+            </a:avLst>
+          </a:prstGeom>
+          <a:noFill/>
+          <a:ln w="19050">
+            <a:solidFill>
+              <a:schemeClr val="accent1"/>
+            </a:solidFill>
+            <a:prstDash val="sysDash"/>
+          </a:ln>
+        </p:spPr>
+        <p:style>
+          <a:lnRef idx="0">
+            <a:scrgbClr r="0" g="0" b="0"/>
+          </a:lnRef>
+          <a:fillRef idx="0">
+            <a:scrgbClr r="0" g="0" b="0"/>
+          </a:fillRef>
+          <a:effectRef idx="0">
+            <a:scrgbClr r="0" g="0" b="0"/>
+          </a:effectRef>
+          <a:fontRef idx="minor">
+            <a:schemeClr val="lt1"/>
+          </a:fontRef>
+        </p:style>
+        <p:txBody>
+          <a:bodyPr rtlCol="0" anchor="ctr"/>
+          <a:lstStyle/>
+          <a:p>
+            <a:pPr algn="r"/>
+            <a:r>
+              <a:rPr lang="pt-BR" sz="1400" b="1" dirty="0">
+                <a:solidFill>
+                  <a:schemeClr val="accent1">
+                    <a:lumMod val="50000"/>
+                  </a:schemeClr>
+                </a:solidFill>
+              </a:rPr>
+              <a:t>Fontes de dados</a:t>
+            </a:r>
+          </a:p>
+        </p:txBody>
+      </p:sp>
+      <p:sp>
+        <p:nvSpPr>
+          <p:cNvPr id="4" name="Retângulo: Cantos Arredondados 3">
+            <a:extLst>
+              <a:ext uri="{FF2B5EF4-FFF2-40B4-BE49-F238E27FC236}">
+                <a16:creationId xmlns:a16="http://schemas.microsoft.com/office/drawing/2014/main" id="{7BBA9DCF-12BE-DA35-422E-9F83F7BD9CBB}"/>
+              </a:ext>
+            </a:extLst>
+          </p:cNvPr>
+          <p:cNvSpPr/>
+          <p:nvPr/>
+        </p:nvSpPr>
+        <p:spPr>
+          <a:xfrm>
+            <a:off x="10861326" y="24950830"/>
+            <a:ext cx="2273397" cy="440202"/>
+          </a:xfrm>
+          <a:prstGeom prst="roundRect">
+            <a:avLst>
+              <a:gd name="adj" fmla="val 4410"/>
+            </a:avLst>
+          </a:prstGeom>
+          <a:solidFill>
+            <a:schemeClr val="accent1">
+              <a:lumMod val="60000"/>
+              <a:lumOff val="40000"/>
+            </a:schemeClr>
+          </a:solidFill>
+          <a:ln w="19050">
+            <a:solidFill>
+              <a:schemeClr val="accent1"/>
+            </a:solidFill>
+            <a:prstDash val="sysDash"/>
+          </a:ln>
+        </p:spPr>
+        <p:style>
+          <a:lnRef idx="0">
+            <a:scrgbClr r="0" g="0" b="0"/>
+          </a:lnRef>
+          <a:fillRef idx="0">
+            <a:scrgbClr r="0" g="0" b="0"/>
+          </a:fillRef>
+          <a:effectRef idx="0">
+            <a:scrgbClr r="0" g="0" b="0"/>
+          </a:effectRef>
+          <a:fontRef idx="minor">
+            <a:schemeClr val="lt1"/>
+          </a:fontRef>
+        </p:style>
+        <p:txBody>
+          <a:bodyPr rtlCol="0" anchor="ctr"/>
+          <a:lstStyle/>
+          <a:p>
+            <a:pPr algn="r"/>
+            <a:r>
+              <a:rPr lang="pt-BR" sz="1400" b="1" dirty="0">
+                <a:solidFill>
+                  <a:schemeClr val="accent1">
+                    <a:lumMod val="50000"/>
+                  </a:schemeClr>
+                </a:solidFill>
+              </a:rPr>
+              <a:t>Ferramentas de Ingestão</a:t>
+            </a:r>
+          </a:p>
+        </p:txBody>
+      </p:sp>
+      <p:pic>
+        <p:nvPicPr>
+          <p:cNvPr id="6" name="Imagem 5">
+            <a:extLst>
+              <a:ext uri="{FF2B5EF4-FFF2-40B4-BE49-F238E27FC236}">
+                <a16:creationId xmlns:a16="http://schemas.microsoft.com/office/drawing/2014/main" id="{42BF8C13-DA05-6C50-ABCE-0B8867E81AB7}"/>
+              </a:ext>
+            </a:extLst>
+          </p:cNvPr>
+          <p:cNvPicPr>
+            <a:picLocks noChangeAspect="1"/>
+          </p:cNvPicPr>
+          <p:nvPr/>
+        </p:nvPicPr>
+        <p:blipFill>
+          <a:blip r:embed="rId9">
+            <a:clrChange>
+              <a:clrFrom>
+                <a:srgbClr val="FFFFFF"/>
+              </a:clrFrom>
+              <a:clrTo>
+                <a:srgbClr val="FFFFFF">
+                  <a:alpha val="0"/>
+                </a:srgbClr>
+              </a:clrTo>
+            </a:clrChange>
+          </a:blip>
+          <a:stretch>
+            <a:fillRect/>
+          </a:stretch>
+        </p:blipFill>
+        <p:spPr>
+          <a:xfrm>
+            <a:off x="14196245" y="25023683"/>
+            <a:ext cx="299849" cy="294495"/>
+          </a:xfrm>
+          <a:prstGeom prst="rect">
+            <a:avLst/>
+          </a:prstGeom>
+        </p:spPr>
+      </p:pic>
+      <p:pic>
+        <p:nvPicPr>
+          <p:cNvPr id="43" name="Imagem 15">
+            <a:extLst>
+              <a:ext uri="{FF2B5EF4-FFF2-40B4-BE49-F238E27FC236}">
+                <a16:creationId xmlns:a16="http://schemas.microsoft.com/office/drawing/2014/main" id="{99CE4FE7-ACCE-9848-3A95-6B8FB7E75185}"/>
+              </a:ext>
+            </a:extLst>
+          </p:cNvPr>
+          <p:cNvPicPr>
+            <a:picLocks noChangeAspect="1"/>
+          </p:cNvPicPr>
+          <p:nvPr/>
+        </p:nvPicPr>
+        <p:blipFill>
+          <a:blip r:embed="rId10"/>
+          <a:stretch>
+            <a:fillRect/>
+          </a:stretch>
+        </p:blipFill>
+        <p:spPr>
+          <a:xfrm>
+            <a:off x="10908647" y="25041452"/>
+            <a:ext cx="270276" cy="258955"/>
+          </a:xfrm>
+          <a:prstGeom prst="rect">
+            <a:avLst/>
+          </a:prstGeom>
+        </p:spPr>
+      </p:pic>
+      <p:pic>
+        <p:nvPicPr>
+          <p:cNvPr id="44" name="Imagem 43">
+            <a:extLst>
+              <a:ext uri="{FF2B5EF4-FFF2-40B4-BE49-F238E27FC236}">
+                <a16:creationId xmlns:a16="http://schemas.microsoft.com/office/drawing/2014/main" id="{41B5F17E-2508-A855-3956-C28A14F01955}"/>
+              </a:ext>
+            </a:extLst>
+          </p:cNvPr>
+          <p:cNvPicPr>
+            <a:picLocks noChangeAspect="1"/>
+          </p:cNvPicPr>
+          <p:nvPr/>
+        </p:nvPicPr>
+        <p:blipFill rotWithShape="1">
+          <a:blip r:embed="rId11"/>
+          <a:srcRect r="61776" b="46571"/>
+          <a:stretch/>
+        </p:blipFill>
+        <p:spPr>
+          <a:xfrm>
+            <a:off x="8308217" y="25023683"/>
+            <a:ext cx="344656" cy="315636"/>
+          </a:xfrm>
+          <a:prstGeom prst="rect">
+            <a:avLst/>
+          </a:prstGeom>
+        </p:spPr>
+      </p:pic>
+      <p:sp>
+        <p:nvSpPr>
+          <p:cNvPr id="48" name="Retângulo: Cantos Arredondados 47">
+            <a:extLst>
+              <a:ext uri="{FF2B5EF4-FFF2-40B4-BE49-F238E27FC236}">
+                <a16:creationId xmlns:a16="http://schemas.microsoft.com/office/drawing/2014/main" id="{B6E09F37-8033-CBFE-7FCE-13AFE017E06F}"/>
+              </a:ext>
+            </a:extLst>
+          </p:cNvPr>
+          <p:cNvSpPr/>
+          <p:nvPr/>
+        </p:nvSpPr>
+        <p:spPr>
+          <a:xfrm>
+            <a:off x="14070400" y="24950830"/>
+            <a:ext cx="1768848" cy="440202"/>
+          </a:xfrm>
+          <a:prstGeom prst="roundRect">
+            <a:avLst>
+              <a:gd name="adj" fmla="val 4410"/>
+            </a:avLst>
+          </a:prstGeom>
+          <a:noFill/>
+          <a:ln w="19050">
+            <a:solidFill>
+              <a:schemeClr val="accent1"/>
+            </a:solidFill>
+            <a:prstDash val="sysDash"/>
+          </a:ln>
+        </p:spPr>
+        <p:style>
+          <a:lnRef idx="0">
+            <a:scrgbClr r="0" g="0" b="0"/>
+          </a:lnRef>
+          <a:fillRef idx="0">
+            <a:scrgbClr r="0" g="0" b="0"/>
+          </a:fillRef>
+          <a:effectRef idx="0">
+            <a:scrgbClr r="0" g="0" b="0"/>
+          </a:effectRef>
+          <a:fontRef idx="minor">
+            <a:schemeClr val="lt1"/>
+          </a:fontRef>
+        </p:style>
+        <p:txBody>
+          <a:bodyPr rtlCol="0" anchor="ctr"/>
+          <a:lstStyle/>
+          <a:p>
+            <a:pPr algn="r"/>
+            <a:r>
+              <a:rPr lang="pt-BR" sz="1400" b="1" dirty="0">
+                <a:solidFill>
+                  <a:schemeClr val="accent1">
+                    <a:lumMod val="50000"/>
+                  </a:schemeClr>
+                </a:solidFill>
+              </a:rPr>
+              <a:t>Object Storage</a:t>
+            </a:r>
+          </a:p>
+        </p:txBody>
+      </p:sp>
+      <p:cxnSp>
+        <p:nvCxnSpPr>
+          <p:cNvPr id="49" name="Conector de Seta Reta 48">
+            <a:extLst>
+              <a:ext uri="{FF2B5EF4-FFF2-40B4-BE49-F238E27FC236}">
+                <a16:creationId xmlns:a16="http://schemas.microsoft.com/office/drawing/2014/main" id="{52F3446B-F4EF-00E0-5142-03DF856D11D5}"/>
+              </a:ext>
+            </a:extLst>
+          </p:cNvPr>
+          <p:cNvCxnSpPr>
+            <a:cxnSpLocks/>
+            <a:stCxn id="4" idx="1"/>
+            <a:endCxn id="2" idx="3"/>
+          </p:cNvCxnSpPr>
+          <p:nvPr/>
+        </p:nvCxnSpPr>
+        <p:spPr>
+          <a:xfrm flipH="1">
+            <a:off x="9981051" y="25170931"/>
+            <a:ext cx="880275" cy="0"/>
+          </a:xfrm>
+          <a:prstGeom prst="straightConnector1">
+            <a:avLst/>
+          </a:prstGeom>
+          <a:ln>
+            <a:tailEnd type="triangle"/>
+          </a:ln>
+        </p:spPr>
+        <p:style>
+          <a:lnRef idx="1">
+            <a:schemeClr val="accent1"/>
+          </a:lnRef>
+          <a:fillRef idx="0">
+            <a:schemeClr val="accent1"/>
+          </a:fillRef>
+          <a:effectRef idx="0">
+            <a:schemeClr val="accent1"/>
+          </a:effectRef>
+          <a:fontRef idx="minor">
+            <a:schemeClr val="tx1"/>
+          </a:fontRef>
+        </p:style>
+      </p:cxnSp>
+      <p:sp>
+        <p:nvSpPr>
+          <p:cNvPr id="56" name="CaixaDeTexto 55">
+            <a:extLst>
+              <a:ext uri="{FF2B5EF4-FFF2-40B4-BE49-F238E27FC236}">
+                <a16:creationId xmlns:a16="http://schemas.microsoft.com/office/drawing/2014/main" id="{EA128562-3609-5C62-007A-66CE5467B92D}"/>
+              </a:ext>
+            </a:extLst>
+          </p:cNvPr>
+          <p:cNvSpPr txBox="1"/>
+          <p:nvPr/>
+        </p:nvSpPr>
+        <p:spPr>
+          <a:xfrm>
+            <a:off x="10137333" y="24981446"/>
+            <a:ext cx="564796" cy="200055"/>
+          </a:xfrm>
+          <a:prstGeom prst="rect">
+            <a:avLst/>
+          </a:prstGeom>
+          <a:noFill/>
+          <a:ln>
+            <a:solidFill>
+              <a:schemeClr val="bg1"/>
+            </a:solidFill>
+          </a:ln>
+        </p:spPr>
+        <p:style>
+          <a:lnRef idx="0">
+            <a:scrgbClr r="0" g="0" b="0"/>
+          </a:lnRef>
+          <a:fillRef idx="0">
+            <a:scrgbClr r="0" g="0" b="0"/>
+          </a:fillRef>
+          <a:effectRef idx="0">
+            <a:scrgbClr r="0" g="0" b="0"/>
+          </a:effectRef>
+          <a:fontRef idx="minor">
+            <a:schemeClr val="lt1"/>
+          </a:fontRef>
+        </p:style>
+        <p:txBody>
+          <a:bodyPr wrap="square" lIns="91440" tIns="45720" rIns="91440" bIns="45720" rtlCol="0" anchor="t">
+            <a:spAutoFit/>
+          </a:bodyPr>
+          <a:lstStyle/>
+          <a:p>
+            <a:pPr algn="ctr"/>
+            <a:r>
+              <a:rPr lang="pt-BR" sz="700" b="1" dirty="0">
+                <a:solidFill>
+                  <a:schemeClr val="accent1">
+                    <a:lumMod val="50000"/>
+                  </a:schemeClr>
+                </a:solidFill>
+                <a:latin typeface="Segoe UI"/>
+                <a:ea typeface="Segoe UI Black"/>
+                <a:cs typeface="Segoe UI"/>
+              </a:rPr>
+              <a:t>JBDC</a:t>
+            </a:r>
+            <a:endParaRPr lang="pt-BR" sz="700" b="1" dirty="0">
+              <a:solidFill>
+                <a:schemeClr val="accent1">
+                  <a:lumMod val="50000"/>
+                </a:schemeClr>
+              </a:solidFill>
+              <a:latin typeface="Segoe UI" panose="020B0502040204020203" pitchFamily="34" charset="0"/>
+              <a:ea typeface="Segoe UI Black" panose="020B0A02040204020203" pitchFamily="34" charset="0"/>
+              <a:cs typeface="Segoe UI" panose="020B0502040204020203" pitchFamily="34" charset="0"/>
+            </a:endParaRPr>
+          </a:p>
+        </p:txBody>
+      </p:sp>
+      <p:sp>
+        <p:nvSpPr>
+          <p:cNvPr id="57" name="CaixaDeTexto 56">
+            <a:extLst>
+              <a:ext uri="{FF2B5EF4-FFF2-40B4-BE49-F238E27FC236}">
+                <a16:creationId xmlns:a16="http://schemas.microsoft.com/office/drawing/2014/main" id="{CAC696F8-C5BB-E2DA-C356-765BB48F26AC}"/>
+              </a:ext>
+            </a:extLst>
+          </p:cNvPr>
+          <p:cNvSpPr txBox="1"/>
+          <p:nvPr/>
+        </p:nvSpPr>
+        <p:spPr>
+          <a:xfrm>
+            <a:off x="13286129" y="24970874"/>
+            <a:ext cx="675624" cy="200055"/>
+          </a:xfrm>
+          <a:prstGeom prst="rect">
+            <a:avLst/>
+          </a:prstGeom>
+          <a:noFill/>
+          <a:ln>
+            <a:solidFill>
+              <a:schemeClr val="bg1"/>
+            </a:solidFill>
+          </a:ln>
+        </p:spPr>
+        <p:style>
+          <a:lnRef idx="0">
+            <a:scrgbClr r="0" g="0" b="0"/>
+          </a:lnRef>
+          <a:fillRef idx="0">
+            <a:scrgbClr r="0" g="0" b="0"/>
+          </a:fillRef>
+          <a:effectRef idx="0">
+            <a:scrgbClr r="0" g="0" b="0"/>
+          </a:effectRef>
+          <a:fontRef idx="minor">
+            <a:schemeClr val="lt1"/>
+          </a:fontRef>
+        </p:style>
+        <p:txBody>
+          <a:bodyPr wrap="square" lIns="91440" tIns="45720" rIns="91440" bIns="45720" rtlCol="0" anchor="t">
+            <a:spAutoFit/>
+          </a:bodyPr>
+          <a:lstStyle/>
+          <a:p>
+            <a:pPr algn="ctr"/>
+            <a:r>
+              <a:rPr lang="pt-BR" sz="700" b="1" dirty="0">
+                <a:solidFill>
+                  <a:schemeClr val="accent1">
+                    <a:lumMod val="50000"/>
+                  </a:schemeClr>
+                </a:solidFill>
+                <a:latin typeface="Segoe UI"/>
+                <a:ea typeface="Segoe UI Black"/>
+                <a:cs typeface="Segoe UI"/>
+              </a:rPr>
+              <a:t>spark.write</a:t>
+            </a:r>
+            <a:endParaRPr lang="pt-BR" sz="700" b="1" dirty="0">
+              <a:solidFill>
+                <a:schemeClr val="accent1">
+                  <a:lumMod val="50000"/>
+                </a:schemeClr>
+              </a:solidFill>
+              <a:latin typeface="Segoe UI" panose="020B0502040204020203" pitchFamily="34" charset="0"/>
+              <a:ea typeface="Segoe UI Black" panose="020B0A02040204020203" pitchFamily="34" charset="0"/>
+              <a:cs typeface="Segoe UI" panose="020B0502040204020203" pitchFamily="34" charset="0"/>
+            </a:endParaRPr>
+          </a:p>
+        </p:txBody>
+      </p:sp>
+      <p:cxnSp>
+        <p:nvCxnSpPr>
+          <p:cNvPr id="58" name="Conector de Seta Reta 57">
+            <a:extLst>
+              <a:ext uri="{FF2B5EF4-FFF2-40B4-BE49-F238E27FC236}">
+                <a16:creationId xmlns:a16="http://schemas.microsoft.com/office/drawing/2014/main" id="{EE7C26AE-E4C9-9C8C-CEE9-06D6FAD1EB51}"/>
+              </a:ext>
+            </a:extLst>
+          </p:cNvPr>
+          <p:cNvCxnSpPr>
+            <a:cxnSpLocks/>
+            <a:stCxn id="4" idx="3"/>
+            <a:endCxn id="48" idx="1"/>
+          </p:cNvCxnSpPr>
+          <p:nvPr/>
+        </p:nvCxnSpPr>
+        <p:spPr>
+          <a:xfrm>
+            <a:off x="13134723" y="25170931"/>
+            <a:ext cx="935677" cy="0"/>
+          </a:xfrm>
+          <a:prstGeom prst="straightConnector1">
+            <a:avLst/>
+          </a:prstGeom>
+          <a:ln>
+            <a:tailEnd type="triangle"/>
+          </a:ln>
+        </p:spPr>
+        <p:style>
+          <a:lnRef idx="1">
+            <a:schemeClr val="accent1"/>
+          </a:lnRef>
+          <a:fillRef idx="0">
+            <a:schemeClr val="accent1"/>
+          </a:fillRef>
+          <a:effectRef idx="0">
+            <a:schemeClr val="accent1"/>
+          </a:effectRef>
+          <a:fontRef idx="minor">
+            <a:schemeClr val="tx1"/>
+          </a:fontRef>
+        </p:style>
+      </p:cxnSp>
+      <p:sp>
+        <p:nvSpPr>
+          <p:cNvPr id="5" name="Retângulo: Cantos Arredondados 4">
+            <a:extLst>
+              <a:ext uri="{FF2B5EF4-FFF2-40B4-BE49-F238E27FC236}">
+                <a16:creationId xmlns:a16="http://schemas.microsoft.com/office/drawing/2014/main" id="{DBD92256-547B-8D20-366C-9CEB52E85560}"/>
+              </a:ext>
+            </a:extLst>
+          </p:cNvPr>
+          <p:cNvSpPr/>
+          <p:nvPr/>
+        </p:nvSpPr>
+        <p:spPr>
+          <a:xfrm>
+            <a:off x="13151925" y="14501071"/>
+            <a:ext cx="1575539" cy="925969"/>
+          </a:xfrm>
+          <a:prstGeom prst="roundRect">
+            <a:avLst/>
+          </a:prstGeom>
+          <a:noFill/>
+          <a:ln w="38100">
+            <a:solidFill>
+              <a:srgbClr val="C00000"/>
+            </a:solidFill>
+          </a:ln>
+        </p:spPr>
+        <p:style>
+          <a:lnRef idx="2">
+            <a:schemeClr val="accent1">
+              <a:shade val="15000"/>
+            </a:schemeClr>
+          </a:lnRef>
+          <a:fillRef idx="1">
+            <a:schemeClr val="accent1"/>
+          </a:fillRef>
+          <a:effectRef idx="0">
+            <a:schemeClr val="accent1"/>
+          </a:effectRef>
+          <a:fontRef idx="minor">
+            <a:schemeClr val="lt1"/>
+          </a:fontRef>
+        </p:style>
+        <p:txBody>
+          <a:bodyPr rtlCol="0" anchor="ctr"/>
+          <a:lstStyle/>
+          <a:p>
+            <a:pPr algn="ctr"/>
+            <a:endParaRPr lang="pt-BR"/>
+          </a:p>
+        </p:txBody>
+      </p:sp>
     </p:spTree>
     <p:extLst>
       <p:ext uri="{BB962C8B-B14F-4D97-AF65-F5344CB8AC3E}">
@@ -18743,7 +19320,7 @@
         </p:nvSpPr>
         <p:spPr>
           <a:xfrm>
-            <a:off x="34836473" y="16337787"/>
+            <a:off x="14036186" y="25700221"/>
             <a:ext cx="2944155" cy="494815"/>
           </a:xfrm>
           <a:prstGeom prst="rect">
@@ -18826,7 +19403,7 @@
         </p:nvSpPr>
         <p:spPr>
           <a:xfrm>
-            <a:off x="35131264" y="17619069"/>
+            <a:off x="14330977" y="26981503"/>
             <a:ext cx="2927225" cy="3779403"/>
           </a:xfrm>
           <a:prstGeom prst="roundRect">
@@ -18882,7 +19459,7 @@
         </p:nvSpPr>
         <p:spPr>
           <a:xfrm>
-            <a:off x="35565816" y="18268799"/>
+            <a:off x="14765529" y="27631233"/>
             <a:ext cx="2426865" cy="709983"/>
           </a:xfrm>
           <a:prstGeom prst="roundRect">
@@ -18940,7 +19517,7 @@
         </p:nvSpPr>
         <p:spPr>
           <a:xfrm>
-            <a:off x="36428471" y="18135914"/>
+            <a:off x="15628184" y="27498348"/>
             <a:ext cx="501746" cy="307779"/>
           </a:xfrm>
           <a:prstGeom prst="rect">
@@ -19016,7 +19593,7 @@
         </p:nvSpPr>
         <p:spPr>
           <a:xfrm>
-            <a:off x="35754123" y="17664978"/>
+            <a:off x="14953836" y="27027412"/>
             <a:ext cx="2128007" cy="307779"/>
           </a:xfrm>
           <a:prstGeom prst="rect">
@@ -19078,7 +19655,7 @@
         </p:blipFill>
         <p:spPr>
           <a:xfrm>
-            <a:off x="35976062" y="18438957"/>
+            <a:off x="15175775" y="27801391"/>
             <a:ext cx="348846" cy="299124"/>
           </a:xfrm>
           <a:prstGeom prst="rect">
@@ -19108,7 +19685,7 @@
         </p:blipFill>
         <p:spPr>
           <a:xfrm>
-            <a:off x="36409024" y="18624514"/>
+            <a:off x="15608737" y="27986948"/>
             <a:ext cx="348846" cy="299124"/>
           </a:xfrm>
           <a:prstGeom prst="rect">
@@ -19138,7 +19715,7 @@
         </p:blipFill>
         <p:spPr>
           <a:xfrm>
-            <a:off x="36889001" y="18448740"/>
+            <a:off x="16088714" y="27811174"/>
             <a:ext cx="291943" cy="316683"/>
           </a:xfrm>
           <a:prstGeom prst="rect">
@@ -19168,7 +19745,7 @@
         </p:blipFill>
         <p:spPr>
           <a:xfrm>
-            <a:off x="37284852" y="18547701"/>
+            <a:off x="16484565" y="27910135"/>
             <a:ext cx="291943" cy="316683"/>
           </a:xfrm>
           <a:prstGeom prst="rect">
@@ -19190,7 +19767,7 @@
         </p:nvSpPr>
         <p:spPr>
           <a:xfrm>
-            <a:off x="35565816" y="19258431"/>
+            <a:off x="14765529" y="28620865"/>
             <a:ext cx="2426865" cy="709983"/>
           </a:xfrm>
           <a:prstGeom prst="roundRect">
@@ -19248,7 +19825,7 @@
         </p:nvSpPr>
         <p:spPr>
           <a:xfrm>
-            <a:off x="36428475" y="19125546"/>
+            <a:off x="15628188" y="28487980"/>
             <a:ext cx="562661" cy="307779"/>
           </a:xfrm>
           <a:prstGeom prst="rect">
@@ -19332,7 +19909,7 @@
         </p:blipFill>
         <p:spPr>
           <a:xfrm>
-            <a:off x="35976062" y="19428589"/>
+            <a:off x="15175775" y="28791023"/>
             <a:ext cx="348846" cy="299124"/>
           </a:xfrm>
           <a:prstGeom prst="rect">
@@ -19362,7 +19939,7 @@
         </p:blipFill>
         <p:spPr>
           <a:xfrm>
-            <a:off x="36409024" y="19614145"/>
+            <a:off x="15608737" y="28976579"/>
             <a:ext cx="348846" cy="299124"/>
           </a:xfrm>
           <a:prstGeom prst="rect">
@@ -19392,7 +19969,7 @@
         </p:blipFill>
         <p:spPr>
           <a:xfrm>
-            <a:off x="36888998" y="19438372"/>
+            <a:off x="16088711" y="28800806"/>
             <a:ext cx="291943" cy="316683"/>
           </a:xfrm>
           <a:prstGeom prst="rect">
@@ -19422,7 +19999,7 @@
         </p:blipFill>
         <p:spPr>
           <a:xfrm>
-            <a:off x="37284852" y="19537333"/>
+            <a:off x="16484565" y="28899767"/>
             <a:ext cx="291943" cy="316683"/>
           </a:xfrm>
           <a:prstGeom prst="rect">
@@ -19444,7 +20021,7 @@
         </p:nvSpPr>
         <p:spPr>
           <a:xfrm>
-            <a:off x="35590556" y="20248063"/>
+            <a:off x="14790269" y="29610497"/>
             <a:ext cx="2426865" cy="709983"/>
           </a:xfrm>
           <a:prstGeom prst="roundRect">
@@ -19502,7 +20079,7 @@
         </p:nvSpPr>
         <p:spPr>
           <a:xfrm>
-            <a:off x="36453213" y="20115178"/>
+            <a:off x="15652926" y="29477612"/>
             <a:ext cx="663265" cy="307779"/>
           </a:xfrm>
           <a:prstGeom prst="rect">
@@ -19586,7 +20163,7 @@
         </p:blipFill>
         <p:spPr>
           <a:xfrm>
-            <a:off x="36000801" y="20418221"/>
+            <a:off x="15200514" y="29780655"/>
             <a:ext cx="348846" cy="299124"/>
           </a:xfrm>
           <a:prstGeom prst="rect">
@@ -19616,7 +20193,7 @@
         </p:blipFill>
         <p:spPr>
           <a:xfrm>
-            <a:off x="36433763" y="20603777"/>
+            <a:off x="15633476" y="29966211"/>
             <a:ext cx="348846" cy="299124"/>
           </a:xfrm>
           <a:prstGeom prst="rect">
@@ -19646,7 +20223,7 @@
         </p:blipFill>
         <p:spPr>
           <a:xfrm>
-            <a:off x="36901370" y="20428004"/>
+            <a:off x="16101083" y="29790438"/>
             <a:ext cx="291943" cy="316683"/>
           </a:xfrm>
           <a:prstGeom prst="rect">
@@ -19676,7 +20253,7 @@
         </p:blipFill>
         <p:spPr>
           <a:xfrm>
-            <a:off x="37309591" y="20526965"/>
+            <a:off x="16509304" y="29889399"/>
             <a:ext cx="291943" cy="316683"/>
           </a:xfrm>
           <a:prstGeom prst="rect">
@@ -19698,7 +20275,7 @@
         </p:nvSpPr>
         <p:spPr>
           <a:xfrm>
-            <a:off x="35131264" y="21552059"/>
+            <a:off x="14330977" y="30914493"/>
             <a:ext cx="2927225" cy="829662"/>
           </a:xfrm>
           <a:prstGeom prst="roundRect">
@@ -19754,7 +20331,7 @@
         </p:nvSpPr>
         <p:spPr>
           <a:xfrm>
-            <a:off x="35754122" y="21536513"/>
+            <a:off x="14953835" y="30898947"/>
             <a:ext cx="2128007" cy="307779"/>
           </a:xfrm>
           <a:prstGeom prst="rect">
@@ -19816,7 +20393,7 @@
         </p:blipFill>
         <p:spPr>
           <a:xfrm>
-            <a:off x="36509348" y="21821707"/>
+            <a:off x="15709061" y="31184141"/>
             <a:ext cx="387594" cy="440267"/>
           </a:xfrm>
           <a:prstGeom prst="rect">
@@ -19838,7 +20415,7 @@
         </p:nvSpPr>
         <p:spPr>
           <a:xfrm>
-            <a:off x="35105302" y="22549701"/>
+            <a:off x="14305015" y="31912135"/>
             <a:ext cx="2993937" cy="981040"/>
           </a:xfrm>
           <a:prstGeom prst="rect">
@@ -19939,7 +20516,7 @@
         </p:blipFill>
         <p:spPr>
           <a:xfrm>
-            <a:off x="37758251" y="18134013"/>
+            <a:off x="16957964" y="27496447"/>
             <a:ext cx="347390" cy="347390"/>
           </a:xfrm>
           <a:prstGeom prst="rect">
@@ -20101,7 +20678,7 @@
         </p:nvSpPr>
         <p:spPr>
           <a:xfrm>
-            <a:off x="30725251" y="17707080"/>
+            <a:off x="9924964" y="27069514"/>
             <a:ext cx="2911862" cy="4778014"/>
           </a:xfrm>
           <a:prstGeom prst="roundRect">
@@ -20157,7 +20734,7 @@
         </p:nvSpPr>
         <p:spPr>
           <a:xfrm>
-            <a:off x="30987861" y="18442321"/>
+            <a:off x="10187574" y="27804755"/>
             <a:ext cx="2414494" cy="1217168"/>
           </a:xfrm>
           <a:prstGeom prst="roundRect">
@@ -20215,7 +20792,7 @@
         </p:nvSpPr>
         <p:spPr>
           <a:xfrm>
-            <a:off x="31528882" y="18284695"/>
+            <a:off x="10728595" y="27647129"/>
             <a:ext cx="1383846" cy="307779"/>
           </a:xfrm>
           <a:prstGeom prst="rect">
@@ -20291,7 +20868,7 @@
         </p:nvSpPr>
         <p:spPr>
           <a:xfrm>
-            <a:off x="31271417" y="17865714"/>
+            <a:off x="10471130" y="27228148"/>
             <a:ext cx="2128007" cy="307779"/>
           </a:xfrm>
           <a:prstGeom prst="rect">
@@ -20345,7 +20922,7 @@
         </p:nvSpPr>
         <p:spPr>
           <a:xfrm>
-            <a:off x="30987863" y="20062840"/>
+            <a:off x="10187576" y="29425274"/>
             <a:ext cx="2451605" cy="1006872"/>
           </a:xfrm>
           <a:prstGeom prst="roundRect">
@@ -20403,7 +20980,7 @@
         </p:nvSpPr>
         <p:spPr>
           <a:xfrm>
-            <a:off x="31640219" y="19880476"/>
+            <a:off x="10839932" y="29242910"/>
             <a:ext cx="1128585" cy="307779"/>
           </a:xfrm>
           <a:prstGeom prst="rect">
@@ -20479,7 +21056,7 @@
         </p:nvSpPr>
         <p:spPr>
           <a:xfrm>
-            <a:off x="31049707" y="21299882"/>
+            <a:off x="10249420" y="30662316"/>
             <a:ext cx="2426864" cy="969761"/>
           </a:xfrm>
           <a:prstGeom prst="roundRect">
@@ -20537,7 +21114,7 @@
         </p:nvSpPr>
         <p:spPr>
           <a:xfrm>
-            <a:off x="31795645" y="21154627"/>
+            <a:off x="10995358" y="30517061"/>
             <a:ext cx="1083636" cy="307779"/>
           </a:xfrm>
           <a:prstGeom prst="rect">
@@ -20621,7 +21198,7 @@
         </p:blipFill>
         <p:spPr>
           <a:xfrm>
-            <a:off x="32156613" y="18813005"/>
+            <a:off x="11356326" y="28175439"/>
             <a:ext cx="291943" cy="316683"/>
           </a:xfrm>
           <a:prstGeom prst="rect">
@@ -20651,7 +21228,7 @@
         </p:blipFill>
         <p:spPr>
           <a:xfrm>
-            <a:off x="31778917" y="18809812"/>
+            <a:off x="10978630" y="28172246"/>
             <a:ext cx="291943" cy="316683"/>
           </a:xfrm>
           <a:prstGeom prst="rect">
@@ -20681,7 +21258,7 @@
         </p:blipFill>
         <p:spPr>
           <a:xfrm>
-            <a:off x="32851949" y="18931919"/>
+            <a:off x="12051662" y="28294353"/>
             <a:ext cx="378535" cy="366164"/>
           </a:xfrm>
           <a:prstGeom prst="rect">
@@ -20703,7 +21280,7 @@
         </p:nvSpPr>
         <p:spPr>
           <a:xfrm>
-            <a:off x="30982686" y="18925895"/>
+            <a:off x="10182399" y="28288329"/>
             <a:ext cx="758633" cy="269307"/>
           </a:xfrm>
           <a:prstGeom prst="rect">
@@ -20757,7 +21334,7 @@
         </p:nvSpPr>
         <p:spPr>
           <a:xfrm>
-            <a:off x="32816092" y="18667313"/>
+            <a:off x="12015805" y="28029747"/>
             <a:ext cx="573078" cy="269307"/>
           </a:xfrm>
           <a:prstGeom prst="rect">
@@ -20813,7 +21390,7 @@
         </p:nvCxnSpPr>
         <p:spPr>
           <a:xfrm>
-            <a:off x="32535833" y="18993845"/>
+            <a:off x="11735546" y="28356279"/>
             <a:ext cx="278887" cy="141658"/>
           </a:xfrm>
           <a:prstGeom prst="straightConnector1">
@@ -20860,7 +21437,7 @@
         </p:nvCxnSpPr>
         <p:spPr>
           <a:xfrm>
-            <a:off x="33682970" y="18312173"/>
+            <a:off x="12882683" y="27674607"/>
             <a:ext cx="1502161" cy="6383"/>
           </a:xfrm>
           <a:prstGeom prst="straightConnector1">
@@ -20907,7 +21484,7 @@
         </p:nvCxnSpPr>
         <p:spPr>
           <a:xfrm>
-            <a:off x="33574190" y="20888479"/>
+            <a:off x="12773903" y="30250913"/>
             <a:ext cx="1179096" cy="125777"/>
           </a:xfrm>
           <a:prstGeom prst="straightConnector1">
@@ -20954,7 +21531,7 @@
         </p:nvCxnSpPr>
         <p:spPr>
           <a:xfrm>
-            <a:off x="33498823" y="19048071"/>
+            <a:off x="12698536" y="28410505"/>
             <a:ext cx="1330532" cy="1327182"/>
           </a:xfrm>
           <a:prstGeom prst="straightConnector1">
@@ -21007,7 +21584,7 @@
         </p:blipFill>
         <p:spPr>
           <a:xfrm>
-            <a:off x="34315307" y="18182308"/>
+            <a:off x="13515020" y="27544742"/>
             <a:ext cx="347390" cy="347390"/>
           </a:xfrm>
           <a:prstGeom prst="rect">
@@ -21037,7 +21614,7 @@
         </p:blipFill>
         <p:spPr>
           <a:xfrm>
-            <a:off x="34270482" y="20737306"/>
+            <a:off x="13470195" y="30099740"/>
             <a:ext cx="347390" cy="347390"/>
           </a:xfrm>
           <a:prstGeom prst="rect">
@@ -21066,7 +21643,7 @@
         </p:blipFill>
         <p:spPr>
           <a:xfrm>
-            <a:off x="31673536" y="19246962"/>
+            <a:off x="10873249" y="28609396"/>
             <a:ext cx="1005888" cy="320212"/>
           </a:xfrm>
           <a:prstGeom prst="rect">
@@ -21088,7 +21665,7 @@
         </p:nvSpPr>
         <p:spPr>
           <a:xfrm>
-            <a:off x="30982681" y="19160930"/>
+            <a:off x="10182394" y="28523364"/>
             <a:ext cx="1006040" cy="423195"/>
           </a:xfrm>
           <a:prstGeom prst="rect">
@@ -21178,7 +21755,7 @@
         </p:blipFill>
         <p:spPr>
           <a:xfrm>
-            <a:off x="32206094" y="20247972"/>
+            <a:off x="11405807" y="29610406"/>
             <a:ext cx="291943" cy="316683"/>
           </a:xfrm>
           <a:prstGeom prst="rect">
@@ -21208,7 +21785,7 @@
         </p:blipFill>
         <p:spPr>
           <a:xfrm>
-            <a:off x="31828398" y="20244779"/>
+            <a:off x="11028111" y="29607213"/>
             <a:ext cx="291943" cy="316683"/>
           </a:xfrm>
           <a:prstGeom prst="rect">
@@ -21238,7 +21815,7 @@
         </p:blipFill>
         <p:spPr>
           <a:xfrm>
-            <a:off x="32901431" y="20366886"/>
+            <a:off x="12101144" y="29729320"/>
             <a:ext cx="378535" cy="366164"/>
           </a:xfrm>
           <a:prstGeom prst="rect">
@@ -21260,7 +21837,7 @@
         </p:nvSpPr>
         <p:spPr>
           <a:xfrm>
-            <a:off x="31032168" y="20360862"/>
+            <a:off x="10231881" y="29723296"/>
             <a:ext cx="758633" cy="269307"/>
           </a:xfrm>
           <a:prstGeom prst="rect">
@@ -21314,7 +21891,7 @@
         </p:nvSpPr>
         <p:spPr>
           <a:xfrm>
-            <a:off x="32865573" y="20102280"/>
+            <a:off x="12065286" y="29464714"/>
             <a:ext cx="573078" cy="269307"/>
           </a:xfrm>
           <a:prstGeom prst="rect">
@@ -21370,7 +21947,7 @@
         </p:nvCxnSpPr>
         <p:spPr>
           <a:xfrm>
-            <a:off x="32585314" y="20428812"/>
+            <a:off x="11785027" y="29791246"/>
             <a:ext cx="278887" cy="141658"/>
           </a:xfrm>
           <a:prstGeom prst="straightConnector1">
@@ -21422,7 +21999,7 @@
         </p:blipFill>
         <p:spPr>
           <a:xfrm>
-            <a:off x="31723018" y="20681928"/>
+            <a:off x="10922731" y="30044362"/>
             <a:ext cx="1005888" cy="320212"/>
           </a:xfrm>
           <a:prstGeom prst="rect">
@@ -21444,7 +22021,7 @@
         </p:nvSpPr>
         <p:spPr>
           <a:xfrm>
-            <a:off x="31032163" y="20595897"/>
+            <a:off x="10231876" y="29958331"/>
             <a:ext cx="1006040" cy="423195"/>
           </a:xfrm>
           <a:prstGeom prst="rect">
@@ -21534,7 +22111,7 @@
         </p:blipFill>
         <p:spPr>
           <a:xfrm>
-            <a:off x="32280317" y="21522123"/>
+            <a:off x="11480030" y="30884557"/>
             <a:ext cx="291943" cy="316683"/>
           </a:xfrm>
           <a:prstGeom prst="rect">
@@ -21564,7 +22141,7 @@
         </p:blipFill>
         <p:spPr>
           <a:xfrm>
-            <a:off x="31902621" y="21518931"/>
+            <a:off x="11102334" y="30881365"/>
             <a:ext cx="291943" cy="316683"/>
           </a:xfrm>
           <a:prstGeom prst="rect">
@@ -21594,7 +22171,7 @@
         </p:blipFill>
         <p:spPr>
           <a:xfrm>
-            <a:off x="32975653" y="21641038"/>
+            <a:off x="12175366" y="31003472"/>
             <a:ext cx="378535" cy="366164"/>
           </a:xfrm>
           <a:prstGeom prst="rect">
@@ -21616,7 +22193,7 @@
         </p:nvSpPr>
         <p:spPr>
           <a:xfrm>
-            <a:off x="31106390" y="21635013"/>
+            <a:off x="10306103" y="30997447"/>
             <a:ext cx="758633" cy="269307"/>
           </a:xfrm>
           <a:prstGeom prst="rect">
@@ -21670,7 +22247,7 @@
         </p:nvSpPr>
         <p:spPr>
           <a:xfrm>
-            <a:off x="32939796" y="21376431"/>
+            <a:off x="12139509" y="30738865"/>
             <a:ext cx="573078" cy="269307"/>
           </a:xfrm>
           <a:prstGeom prst="rect">
@@ -21726,7 +22303,7 @@
         </p:nvCxnSpPr>
         <p:spPr>
           <a:xfrm>
-            <a:off x="32659537" y="21702964"/>
+            <a:off x="11859250" y="31065398"/>
             <a:ext cx="278887" cy="141658"/>
           </a:xfrm>
           <a:prstGeom prst="straightConnector1">
@@ -21778,7 +22355,7 @@
         </p:blipFill>
         <p:spPr>
           <a:xfrm>
-            <a:off x="31797240" y="21956080"/>
+            <a:off x="10996953" y="31318514"/>
             <a:ext cx="1005888" cy="320212"/>
           </a:xfrm>
           <a:prstGeom prst="rect">
@@ -21800,7 +22377,7 @@
         </p:nvSpPr>
         <p:spPr>
           <a:xfrm>
-            <a:off x="31106385" y="21870049"/>
+            <a:off x="10306098" y="31232483"/>
             <a:ext cx="1006040" cy="423195"/>
           </a:xfrm>
           <a:prstGeom prst="rect">
@@ -21884,7 +22461,7 @@
         </p:nvCxnSpPr>
         <p:spPr>
           <a:xfrm>
-            <a:off x="29156193" y="19580658"/>
+            <a:off x="8355906" y="28943092"/>
             <a:ext cx="1761914" cy="3063"/>
           </a:xfrm>
           <a:prstGeom prst="straightConnector1">
@@ -21929,7 +22506,7 @@
         </p:nvSpPr>
         <p:spPr>
           <a:xfrm>
-            <a:off x="29962127" y="19579052"/>
+            <a:off x="9161840" y="28941486"/>
             <a:ext cx="758633" cy="269307"/>
           </a:xfrm>
           <a:prstGeom prst="rect">
@@ -21985,7 +22562,7 @@
         </p:nvCxnSpPr>
         <p:spPr>
           <a:xfrm>
-            <a:off x="28625509" y="18519278"/>
+            <a:off x="7825222" y="27881712"/>
             <a:ext cx="2347033" cy="465715"/>
           </a:xfrm>
           <a:prstGeom prst="straightConnector1">
@@ -22030,7 +22607,7 @@
         </p:nvSpPr>
         <p:spPr>
           <a:xfrm>
-            <a:off x="29798837" y="18885071"/>
+            <a:off x="8998550" y="28247505"/>
             <a:ext cx="949137" cy="269307"/>
           </a:xfrm>
           <a:prstGeom prst="rect">
@@ -22092,7 +22669,7 @@
         </p:blipFill>
         <p:spPr>
           <a:xfrm>
-            <a:off x="30046602" y="19170108"/>
+            <a:off x="9246315" y="28532542"/>
             <a:ext cx="347390" cy="347390"/>
           </a:xfrm>
           <a:prstGeom prst="rect">
@@ -28355,7 +28932,7 @@
         </p:nvSpPr>
         <p:spPr>
           <a:xfrm>
-            <a:off x="34836473" y="16337787"/>
+            <a:off x="11650514" y="27308144"/>
             <a:ext cx="2944155" cy="494815"/>
           </a:xfrm>
           <a:prstGeom prst="rect">
@@ -28438,7 +29015,7 @@
         </p:nvSpPr>
         <p:spPr>
           <a:xfrm>
-            <a:off x="35131264" y="17619069"/>
+            <a:off x="11945305" y="28589426"/>
             <a:ext cx="2927225" cy="3779403"/>
           </a:xfrm>
           <a:prstGeom prst="roundRect">
@@ -28494,7 +29071,7 @@
         </p:nvSpPr>
         <p:spPr>
           <a:xfrm>
-            <a:off x="35565816" y="18268799"/>
+            <a:off x="12379857" y="29239156"/>
             <a:ext cx="2426865" cy="709983"/>
           </a:xfrm>
           <a:prstGeom prst="roundRect">
@@ -28552,7 +29129,7 @@
         </p:nvSpPr>
         <p:spPr>
           <a:xfrm>
-            <a:off x="36428471" y="18135914"/>
+            <a:off x="13242512" y="29106271"/>
             <a:ext cx="501746" cy="307779"/>
           </a:xfrm>
           <a:prstGeom prst="rect">
@@ -28628,7 +29205,7 @@
         </p:nvSpPr>
         <p:spPr>
           <a:xfrm>
-            <a:off x="35754123" y="17664978"/>
+            <a:off x="12568164" y="28635335"/>
             <a:ext cx="2128007" cy="307779"/>
           </a:xfrm>
           <a:prstGeom prst="rect">
@@ -28690,7 +29267,7 @@
         </p:blipFill>
         <p:spPr>
           <a:xfrm>
-            <a:off x="35976062" y="18438957"/>
+            <a:off x="12790103" y="29409314"/>
             <a:ext cx="348846" cy="299124"/>
           </a:xfrm>
           <a:prstGeom prst="rect">
@@ -28720,7 +29297,7 @@
         </p:blipFill>
         <p:spPr>
           <a:xfrm>
-            <a:off x="36409024" y="18624514"/>
+            <a:off x="13223065" y="29594871"/>
             <a:ext cx="348846" cy="299124"/>
           </a:xfrm>
           <a:prstGeom prst="rect">
@@ -28750,7 +29327,7 @@
         </p:blipFill>
         <p:spPr>
           <a:xfrm>
-            <a:off x="36889001" y="18448740"/>
+            <a:off x="13703042" y="29419097"/>
             <a:ext cx="291943" cy="316683"/>
           </a:xfrm>
           <a:prstGeom prst="rect">
@@ -28780,7 +29357,7 @@
         </p:blipFill>
         <p:spPr>
           <a:xfrm>
-            <a:off x="37284852" y="18547701"/>
+            <a:off x="14098893" y="29518058"/>
             <a:ext cx="291943" cy="316683"/>
           </a:xfrm>
           <a:prstGeom prst="rect">
@@ -28802,7 +29379,7 @@
         </p:nvSpPr>
         <p:spPr>
           <a:xfrm>
-            <a:off x="35565816" y="19258431"/>
+            <a:off x="12379857" y="30228788"/>
             <a:ext cx="2426865" cy="709983"/>
           </a:xfrm>
           <a:prstGeom prst="roundRect">
@@ -28860,7 +29437,7 @@
         </p:nvSpPr>
         <p:spPr>
           <a:xfrm>
-            <a:off x="36428475" y="19125546"/>
+            <a:off x="13242516" y="30095903"/>
             <a:ext cx="562661" cy="307779"/>
           </a:xfrm>
           <a:prstGeom prst="rect">
@@ -28944,7 +29521,7 @@
         </p:blipFill>
         <p:spPr>
           <a:xfrm>
-            <a:off x="35976062" y="19428589"/>
+            <a:off x="12790103" y="30398946"/>
             <a:ext cx="348846" cy="299124"/>
           </a:xfrm>
           <a:prstGeom prst="rect">
@@ -28974,7 +29551,7 @@
         </p:blipFill>
         <p:spPr>
           <a:xfrm>
-            <a:off x="36409024" y="19614145"/>
+            <a:off x="13223065" y="30584502"/>
             <a:ext cx="348846" cy="299124"/>
           </a:xfrm>
           <a:prstGeom prst="rect">
@@ -29004,7 +29581,7 @@
         </p:blipFill>
         <p:spPr>
           <a:xfrm>
-            <a:off x="36888998" y="19438372"/>
+            <a:off x="13703039" y="30408729"/>
             <a:ext cx="291943" cy="316683"/>
           </a:xfrm>
           <a:prstGeom prst="rect">
@@ -29034,7 +29611,7 @@
         </p:blipFill>
         <p:spPr>
           <a:xfrm>
-            <a:off x="37284852" y="19537333"/>
+            <a:off x="14098893" y="30507690"/>
             <a:ext cx="291943" cy="316683"/>
           </a:xfrm>
           <a:prstGeom prst="rect">
@@ -29056,7 +29633,7 @@
         </p:nvSpPr>
         <p:spPr>
           <a:xfrm>
-            <a:off x="35590556" y="20248063"/>
+            <a:off x="12404597" y="31218420"/>
             <a:ext cx="2426865" cy="709983"/>
           </a:xfrm>
           <a:prstGeom prst="roundRect">
@@ -29114,7 +29691,7 @@
         </p:nvSpPr>
         <p:spPr>
           <a:xfrm>
-            <a:off x="36453213" y="20115178"/>
+            <a:off x="13267254" y="31085535"/>
             <a:ext cx="663265" cy="307779"/>
           </a:xfrm>
           <a:prstGeom prst="rect">
@@ -29198,7 +29775,7 @@
         </p:blipFill>
         <p:spPr>
           <a:xfrm>
-            <a:off x="36000801" y="20418221"/>
+            <a:off x="12814842" y="31388578"/>
             <a:ext cx="348846" cy="299124"/>
           </a:xfrm>
           <a:prstGeom prst="rect">
@@ -29228,7 +29805,7 @@
         </p:blipFill>
         <p:spPr>
           <a:xfrm>
-            <a:off x="36433763" y="20603777"/>
+            <a:off x="13247804" y="31574134"/>
             <a:ext cx="348846" cy="299124"/>
           </a:xfrm>
           <a:prstGeom prst="rect">
@@ -29258,7 +29835,7 @@
         </p:blipFill>
         <p:spPr>
           <a:xfrm>
-            <a:off x="36901370" y="20428004"/>
+            <a:off x="13715411" y="31398361"/>
             <a:ext cx="291943" cy="316683"/>
           </a:xfrm>
           <a:prstGeom prst="rect">
@@ -29288,7 +29865,7 @@
         </p:blipFill>
         <p:spPr>
           <a:xfrm>
-            <a:off x="37309591" y="20526965"/>
+            <a:off x="14123632" y="31497322"/>
             <a:ext cx="291943" cy="316683"/>
           </a:xfrm>
           <a:prstGeom prst="rect">
@@ -29310,7 +29887,7 @@
         </p:nvSpPr>
         <p:spPr>
           <a:xfrm>
-            <a:off x="35131264" y="21552059"/>
+            <a:off x="11945305" y="32522416"/>
             <a:ext cx="2927225" cy="829662"/>
           </a:xfrm>
           <a:prstGeom prst="roundRect">
@@ -29366,7 +29943,7 @@
         </p:nvSpPr>
         <p:spPr>
           <a:xfrm>
-            <a:off x="35754122" y="21536513"/>
+            <a:off x="12568163" y="32506870"/>
             <a:ext cx="2128007" cy="307779"/>
           </a:xfrm>
           <a:prstGeom prst="rect">
@@ -29428,7 +30005,7 @@
         </p:blipFill>
         <p:spPr>
           <a:xfrm>
-            <a:off x="36509348" y="21821707"/>
+            <a:off x="13323389" y="32792064"/>
             <a:ext cx="387594" cy="440267"/>
           </a:xfrm>
           <a:prstGeom prst="rect">
@@ -29450,7 +30027,7 @@
         </p:nvSpPr>
         <p:spPr>
           <a:xfrm>
-            <a:off x="35105302" y="22549701"/>
+            <a:off x="11919343" y="33520058"/>
             <a:ext cx="2993937" cy="981040"/>
           </a:xfrm>
           <a:prstGeom prst="rect">
@@ -29551,7 +30128,7 @@
         </p:blipFill>
         <p:spPr>
           <a:xfrm>
-            <a:off x="37758251" y="18134013"/>
+            <a:off x="14572292" y="29104370"/>
             <a:ext cx="347390" cy="347390"/>
           </a:xfrm>
           <a:prstGeom prst="rect">
@@ -29699,7 +30276,7 @@
         </p:nvSpPr>
         <p:spPr>
           <a:xfrm>
-            <a:off x="30725251" y="17707080"/>
+            <a:off x="7539292" y="28677437"/>
             <a:ext cx="2911862" cy="4778014"/>
           </a:xfrm>
           <a:prstGeom prst="roundRect">
@@ -29755,7 +30332,7 @@
         </p:nvSpPr>
         <p:spPr>
           <a:xfrm>
-            <a:off x="30987861" y="18442321"/>
+            <a:off x="7801902" y="29412678"/>
             <a:ext cx="2414494" cy="1217168"/>
           </a:xfrm>
           <a:prstGeom prst="roundRect">
@@ -29813,7 +30390,7 @@
         </p:nvSpPr>
         <p:spPr>
           <a:xfrm>
-            <a:off x="31528882" y="18284695"/>
+            <a:off x="8342923" y="29255052"/>
             <a:ext cx="1383846" cy="307779"/>
           </a:xfrm>
           <a:prstGeom prst="rect">
@@ -29889,7 +30466,7 @@
         </p:nvSpPr>
         <p:spPr>
           <a:xfrm>
-            <a:off x="31271417" y="17865714"/>
+            <a:off x="8085458" y="28836071"/>
             <a:ext cx="2128007" cy="307779"/>
           </a:xfrm>
           <a:prstGeom prst="rect">
@@ -29943,7 +30520,7 @@
         </p:nvSpPr>
         <p:spPr>
           <a:xfrm>
-            <a:off x="30987863" y="20062840"/>
+            <a:off x="7801904" y="31033197"/>
             <a:ext cx="2451605" cy="1006872"/>
           </a:xfrm>
           <a:prstGeom prst="roundRect">
@@ -30001,7 +30578,7 @@
         </p:nvSpPr>
         <p:spPr>
           <a:xfrm>
-            <a:off x="31640219" y="19880476"/>
+            <a:off x="8454260" y="30850833"/>
             <a:ext cx="1128585" cy="307779"/>
           </a:xfrm>
           <a:prstGeom prst="rect">
@@ -30077,7 +30654,7 @@
         </p:nvSpPr>
         <p:spPr>
           <a:xfrm>
-            <a:off x="31049707" y="21299882"/>
+            <a:off x="7863748" y="32270239"/>
             <a:ext cx="2426864" cy="969761"/>
           </a:xfrm>
           <a:prstGeom prst="roundRect">
@@ -30135,7 +30712,7 @@
         </p:nvSpPr>
         <p:spPr>
           <a:xfrm>
-            <a:off x="31795645" y="21154627"/>
+            <a:off x="8609686" y="32124984"/>
             <a:ext cx="1083636" cy="307779"/>
           </a:xfrm>
           <a:prstGeom prst="rect">
@@ -30219,7 +30796,7 @@
         </p:blipFill>
         <p:spPr>
           <a:xfrm>
-            <a:off x="32156613" y="18813005"/>
+            <a:off x="8970654" y="29783362"/>
             <a:ext cx="291943" cy="316683"/>
           </a:xfrm>
           <a:prstGeom prst="rect">
@@ -30249,7 +30826,7 @@
         </p:blipFill>
         <p:spPr>
           <a:xfrm>
-            <a:off x="31778917" y="18809812"/>
+            <a:off x="8592958" y="29780169"/>
             <a:ext cx="291943" cy="316683"/>
           </a:xfrm>
           <a:prstGeom prst="rect">
@@ -30279,7 +30856,7 @@
         </p:blipFill>
         <p:spPr>
           <a:xfrm>
-            <a:off x="32851949" y="18931919"/>
+            <a:off x="9665990" y="29902276"/>
             <a:ext cx="378535" cy="366164"/>
           </a:xfrm>
           <a:prstGeom prst="rect">
@@ -30301,7 +30878,7 @@
         </p:nvSpPr>
         <p:spPr>
           <a:xfrm>
-            <a:off x="30982686" y="18925895"/>
+            <a:off x="7796727" y="29896252"/>
             <a:ext cx="758633" cy="269307"/>
           </a:xfrm>
           <a:prstGeom prst="rect">
@@ -30355,7 +30932,7 @@
         </p:nvSpPr>
         <p:spPr>
           <a:xfrm>
-            <a:off x="32816092" y="18667313"/>
+            <a:off x="9630133" y="29637670"/>
             <a:ext cx="573078" cy="269307"/>
           </a:xfrm>
           <a:prstGeom prst="rect">
@@ -30411,7 +30988,7 @@
         </p:nvCxnSpPr>
         <p:spPr>
           <a:xfrm>
-            <a:off x="32535833" y="18993845"/>
+            <a:off x="9349874" y="29964202"/>
             <a:ext cx="278887" cy="141658"/>
           </a:xfrm>
           <a:prstGeom prst="straightConnector1">
@@ -30458,7 +31035,7 @@
         </p:nvCxnSpPr>
         <p:spPr>
           <a:xfrm>
-            <a:off x="33682970" y="18312173"/>
+            <a:off x="10497011" y="29282530"/>
             <a:ext cx="1502161" cy="6383"/>
           </a:xfrm>
           <a:prstGeom prst="straightConnector1">
@@ -30505,7 +31082,7 @@
         </p:nvCxnSpPr>
         <p:spPr>
           <a:xfrm>
-            <a:off x="33574190" y="20888479"/>
+            <a:off x="10388231" y="31858836"/>
             <a:ext cx="1179096" cy="125777"/>
           </a:xfrm>
           <a:prstGeom prst="straightConnector1">
@@ -30552,7 +31129,7 @@
         </p:nvCxnSpPr>
         <p:spPr>
           <a:xfrm>
-            <a:off x="33498823" y="19048071"/>
+            <a:off x="10312864" y="30018428"/>
             <a:ext cx="1330532" cy="1327182"/>
           </a:xfrm>
           <a:prstGeom prst="straightConnector1">
@@ -30605,7 +31182,7 @@
         </p:blipFill>
         <p:spPr>
           <a:xfrm>
-            <a:off x="34315307" y="18182308"/>
+            <a:off x="11129348" y="29152665"/>
             <a:ext cx="347390" cy="347390"/>
           </a:xfrm>
           <a:prstGeom prst="rect">
@@ -30635,7 +31212,7 @@
         </p:blipFill>
         <p:spPr>
           <a:xfrm>
-            <a:off x="34270482" y="20737306"/>
+            <a:off x="11084523" y="31707663"/>
             <a:ext cx="347390" cy="347390"/>
           </a:xfrm>
           <a:prstGeom prst="rect">
@@ -30664,7 +31241,7 @@
         </p:blipFill>
         <p:spPr>
           <a:xfrm>
-            <a:off x="31673536" y="19246962"/>
+            <a:off x="8487577" y="30217319"/>
             <a:ext cx="1005888" cy="320212"/>
           </a:xfrm>
           <a:prstGeom prst="rect">
@@ -30686,7 +31263,7 @@
         </p:nvSpPr>
         <p:spPr>
           <a:xfrm>
-            <a:off x="30982681" y="19160930"/>
+            <a:off x="7796722" y="30131287"/>
             <a:ext cx="1006040" cy="423195"/>
           </a:xfrm>
           <a:prstGeom prst="rect">
@@ -30776,7 +31353,7 @@
         </p:blipFill>
         <p:spPr>
           <a:xfrm>
-            <a:off x="32206094" y="20247972"/>
+            <a:off x="9020135" y="31218329"/>
             <a:ext cx="291943" cy="316683"/>
           </a:xfrm>
           <a:prstGeom prst="rect">
@@ -30806,7 +31383,7 @@
         </p:blipFill>
         <p:spPr>
           <a:xfrm>
-            <a:off x="31828398" y="20244779"/>
+            <a:off x="8642439" y="31215136"/>
             <a:ext cx="291943" cy="316683"/>
           </a:xfrm>
           <a:prstGeom prst="rect">
@@ -30836,7 +31413,7 @@
         </p:blipFill>
         <p:spPr>
           <a:xfrm>
-            <a:off x="32901431" y="20366886"/>
+            <a:off x="9715472" y="31337243"/>
             <a:ext cx="378535" cy="366164"/>
           </a:xfrm>
           <a:prstGeom prst="rect">
@@ -30858,7 +31435,7 @@
         </p:nvSpPr>
         <p:spPr>
           <a:xfrm>
-            <a:off x="31032168" y="20360862"/>
+            <a:off x="7846209" y="31331219"/>
             <a:ext cx="758633" cy="269307"/>
           </a:xfrm>
           <a:prstGeom prst="rect">
@@ -30912,7 +31489,7 @@
         </p:nvSpPr>
         <p:spPr>
           <a:xfrm>
-            <a:off x="32865573" y="20102280"/>
+            <a:off x="9679614" y="31072637"/>
             <a:ext cx="573078" cy="269307"/>
           </a:xfrm>
           <a:prstGeom prst="rect">
@@ -30968,7 +31545,7 @@
         </p:nvCxnSpPr>
         <p:spPr>
           <a:xfrm>
-            <a:off x="32585314" y="20428812"/>
+            <a:off x="9399355" y="31399169"/>
             <a:ext cx="278887" cy="141658"/>
           </a:xfrm>
           <a:prstGeom prst="straightConnector1">
@@ -31020,7 +31597,7 @@
         </p:blipFill>
         <p:spPr>
           <a:xfrm>
-            <a:off x="31723018" y="20681928"/>
+            <a:off x="8537059" y="31652285"/>
             <a:ext cx="1005888" cy="320212"/>
           </a:xfrm>
           <a:prstGeom prst="rect">
@@ -31042,7 +31619,7 @@
         </p:nvSpPr>
         <p:spPr>
           <a:xfrm>
-            <a:off x="31032163" y="20595897"/>
+            <a:off x="7846204" y="31566254"/>
             <a:ext cx="1006040" cy="423195"/>
           </a:xfrm>
           <a:prstGeom prst="rect">
@@ -31132,7 +31709,7 @@
         </p:blipFill>
         <p:spPr>
           <a:xfrm>
-            <a:off x="32280317" y="21522123"/>
+            <a:off x="9094358" y="32492480"/>
             <a:ext cx="291943" cy="316683"/>
           </a:xfrm>
           <a:prstGeom prst="rect">
@@ -31162,7 +31739,7 @@
         </p:blipFill>
         <p:spPr>
           <a:xfrm>
-            <a:off x="31902621" y="21518931"/>
+            <a:off x="8716662" y="32489288"/>
             <a:ext cx="291943" cy="316683"/>
           </a:xfrm>
           <a:prstGeom prst="rect">
@@ -31192,7 +31769,7 @@
         </p:blipFill>
         <p:spPr>
           <a:xfrm>
-            <a:off x="32975653" y="21641038"/>
+            <a:off x="9789694" y="32611395"/>
             <a:ext cx="378535" cy="366164"/>
           </a:xfrm>
           <a:prstGeom prst="rect">
@@ -31214,7 +31791,7 @@
         </p:nvSpPr>
         <p:spPr>
           <a:xfrm>
-            <a:off x="31106390" y="21635013"/>
+            <a:off x="7920431" y="32605370"/>
             <a:ext cx="758633" cy="269307"/>
           </a:xfrm>
           <a:prstGeom prst="rect">
@@ -31268,7 +31845,7 @@
         </p:nvSpPr>
         <p:spPr>
           <a:xfrm>
-            <a:off x="32939796" y="21376431"/>
+            <a:off x="9753837" y="32346788"/>
             <a:ext cx="573078" cy="269307"/>
           </a:xfrm>
           <a:prstGeom prst="rect">
@@ -31324,7 +31901,7 @@
         </p:nvCxnSpPr>
         <p:spPr>
           <a:xfrm>
-            <a:off x="32659537" y="21702964"/>
+            <a:off x="9473578" y="32673321"/>
             <a:ext cx="278887" cy="141658"/>
           </a:xfrm>
           <a:prstGeom prst="straightConnector1">
@@ -31376,7 +31953,7 @@
         </p:blipFill>
         <p:spPr>
           <a:xfrm>
-            <a:off x="31797240" y="21956080"/>
+            <a:off x="8611281" y="32926437"/>
             <a:ext cx="1005888" cy="320212"/>
           </a:xfrm>
           <a:prstGeom prst="rect">
@@ -31398,7 +31975,7 @@
         </p:nvSpPr>
         <p:spPr>
           <a:xfrm>
-            <a:off x="31106385" y="21870049"/>
+            <a:off x="7920426" y="32840406"/>
             <a:ext cx="1006040" cy="423195"/>
           </a:xfrm>
           <a:prstGeom prst="rect">
@@ -31482,7 +32059,7 @@
         </p:nvCxnSpPr>
         <p:spPr>
           <a:xfrm>
-            <a:off x="29156193" y="19580658"/>
+            <a:off x="5970234" y="30551015"/>
             <a:ext cx="1761914" cy="3063"/>
           </a:xfrm>
           <a:prstGeom prst="straightConnector1">
@@ -31527,7 +32104,7 @@
         </p:nvSpPr>
         <p:spPr>
           <a:xfrm>
-            <a:off x="29962127" y="19579052"/>
+            <a:off x="6776168" y="30549409"/>
             <a:ext cx="758633" cy="269307"/>
           </a:xfrm>
           <a:prstGeom prst="rect">
@@ -31583,7 +32160,7 @@
         </p:nvCxnSpPr>
         <p:spPr>
           <a:xfrm>
-            <a:off x="28625509" y="18519278"/>
+            <a:off x="5439550" y="29489635"/>
             <a:ext cx="2347033" cy="465715"/>
           </a:xfrm>
           <a:prstGeom prst="straightConnector1">
@@ -31628,7 +32205,7 @@
         </p:nvSpPr>
         <p:spPr>
           <a:xfrm>
-            <a:off x="29798837" y="18885071"/>
+            <a:off x="6612878" y="29855428"/>
             <a:ext cx="949137" cy="269307"/>
           </a:xfrm>
           <a:prstGeom prst="rect">
@@ -31690,7 +32267,7 @@
         </p:blipFill>
         <p:spPr>
           <a:xfrm>
-            <a:off x="30046602" y="19170108"/>
+            <a:off x="6860643" y="30140465"/>
             <a:ext cx="347390" cy="347390"/>
           </a:xfrm>
           <a:prstGeom prst="rect">

</xml_diff>